<commit_message>
operazioni con le assunzioni
</commit_message>
<xml_diff>
--- a/File Report/db/lista operazioni.pptx
+++ b/File Report/db/lista operazioni.pptx
@@ -3212,6 +3212,36 @@
           </a:fontRef>
         </p:style>
       </p:cxnSp>
+      <p:cxnSp>
+        <p:nvCxnSpPr>
+          <p:cNvPr id="9" name="Connettore 1 8"/>
+          <p:cNvCxnSpPr/>
+          <p:nvPr/>
+        </p:nvCxnSpPr>
+        <p:spPr>
+          <a:xfrm>
+            <a:off x="1405719" y="1658203"/>
+            <a:ext cx="4967785" cy="47766"/>
+          </a:xfrm>
+          <a:prstGeom prst="line">
+            <a:avLst/>
+          </a:prstGeom>
+        </p:spPr>
+        <p:style>
+          <a:lnRef idx="1">
+            <a:schemeClr val="accent1"/>
+          </a:lnRef>
+          <a:fillRef idx="0">
+            <a:schemeClr val="accent1"/>
+          </a:fillRef>
+          <a:effectRef idx="0">
+            <a:schemeClr val="accent1"/>
+          </a:effectRef>
+          <a:fontRef idx="minor">
+            <a:schemeClr val="tx1"/>
+          </a:fontRef>
+        </p:style>
+      </p:cxnSp>
     </p:spTree>
     <p:extLst>
       <p:ext uri="{BB962C8B-B14F-4D97-AF65-F5344CB8AC3E}">

</xml_diff>